<commit_message>
more edits to the presentation
</commit_message>
<xml_diff>
--- a/Winter2011/Presentation/Project Presentation.pptx
+++ b/Winter2011/Presentation/Project Presentation.pptx
@@ -196,7 +196,8 @@
           <a:p>
             <a:fld id="{7337E328-3B00-480B-87D5-0C6EF7B3B765}" type="datetimeFigureOut">
               <a:rPr lang="en-US" smtClean="0"/>
-              <a:t>4/9/2011</a:t>
+              <a:pPr/>
+              <a:t>4/10/2011</a:t>
             </a:fld>
             <a:endParaRPr lang="en-US"/>
           </a:p>
@@ -357,6 +358,7 @@
           <a:p>
             <a:fld id="{9431258F-3015-4216-AF57-F283CBD0DFF5}" type="slidenum">
               <a:rPr lang="en-US" smtClean="0"/>
+              <a:pPr/>
               <a:t>‹#›</a:t>
             </a:fld>
             <a:endParaRPr lang="en-US"/>
@@ -540,6 +542,7 @@
           <a:p>
             <a:fld id="{9431258F-3015-4216-AF57-F283CBD0DFF5}" type="slidenum">
               <a:rPr lang="en-US" smtClean="0"/>
+              <a:pPr/>
               <a:t>3</a:t>
             </a:fld>
             <a:endParaRPr lang="en-US"/>
@@ -1180,7 +1183,7 @@
             <a:fld id="{1D8BD707-D9CF-40AE-B4C6-C98DA3205C09}" type="datetimeFigureOut">
               <a:rPr lang="en-US" smtClean="0"/>
               <a:pPr/>
-              <a:t>4/9/2011</a:t>
+              <a:t>4/10/2011</a:t>
             </a:fld>
             <a:endParaRPr lang="en-US"/>
           </a:p>
@@ -1378,7 +1381,7 @@
             <a:fld id="{1D8BD707-D9CF-40AE-B4C6-C98DA3205C09}" type="datetimeFigureOut">
               <a:rPr lang="en-US" smtClean="0"/>
               <a:pPr/>
-              <a:t>4/9/2011</a:t>
+              <a:t>4/10/2011</a:t>
             </a:fld>
             <a:endParaRPr lang="en-US"/>
           </a:p>
@@ -1565,7 +1568,7 @@
             <a:fld id="{1D8BD707-D9CF-40AE-B4C6-C98DA3205C09}" type="datetimeFigureOut">
               <a:rPr lang="en-US" smtClean="0"/>
               <a:pPr/>
-              <a:t>4/9/2011</a:t>
+              <a:t>4/10/2011</a:t>
             </a:fld>
             <a:endParaRPr lang="en-US"/>
           </a:p>
@@ -1717,7 +1720,7 @@
             <a:fld id="{1D8BD707-D9CF-40AE-B4C6-C98DA3205C09}" type="datetimeFigureOut">
               <a:rPr lang="en-US" smtClean="0"/>
               <a:pPr/>
-              <a:t>4/9/2011</a:t>
+              <a:t>4/10/2011</a:t>
             </a:fld>
             <a:endParaRPr lang="en-US"/>
           </a:p>
@@ -1974,7 +1977,7 @@
             <a:fld id="{1D8BD707-D9CF-40AE-B4C6-C98DA3205C09}" type="datetimeFigureOut">
               <a:rPr lang="en-US" smtClean="0"/>
               <a:pPr/>
-              <a:t>4/9/2011</a:t>
+              <a:t>4/10/2011</a:t>
             </a:fld>
             <a:endParaRPr lang="en-US"/>
           </a:p>
@@ -2385,7 +2388,7 @@
             <a:fld id="{1D8BD707-D9CF-40AE-B4C6-C98DA3205C09}" type="datetimeFigureOut">
               <a:rPr lang="en-US" smtClean="0"/>
               <a:pPr/>
-              <a:t>4/9/2011</a:t>
+              <a:t>4/10/2011</a:t>
             </a:fld>
             <a:endParaRPr lang="en-US"/>
           </a:p>
@@ -2833,7 +2836,7 @@
             <a:fld id="{1D8BD707-D9CF-40AE-B4C6-C98DA3205C09}" type="datetimeFigureOut">
               <a:rPr lang="en-US" smtClean="0"/>
               <a:pPr/>
-              <a:t>4/9/2011</a:t>
+              <a:t>4/10/2011</a:t>
             </a:fld>
             <a:endParaRPr lang="en-US"/>
           </a:p>
@@ -2936,7 +2939,7 @@
             <a:fld id="{1D8BD707-D9CF-40AE-B4C6-C98DA3205C09}" type="datetimeFigureOut">
               <a:rPr lang="en-US" smtClean="0"/>
               <a:pPr/>
-              <a:t>4/9/2011</a:t>
+              <a:t>4/10/2011</a:t>
             </a:fld>
             <a:endParaRPr lang="en-US"/>
           </a:p>
@@ -3059,7 +3062,7 @@
             <a:fld id="{1D8BD707-D9CF-40AE-B4C6-C98DA3205C09}" type="datetimeFigureOut">
               <a:rPr lang="en-US" smtClean="0"/>
               <a:pPr/>
-              <a:t>4/9/2011</a:t>
+              <a:t>4/10/2011</a:t>
             </a:fld>
             <a:endParaRPr lang="en-US"/>
           </a:p>
@@ -3335,7 +3338,7 @@
             <a:fld id="{1D8BD707-D9CF-40AE-B4C6-C98DA3205C09}" type="datetimeFigureOut">
               <a:rPr lang="en-US" smtClean="0"/>
               <a:pPr/>
-              <a:t>4/9/2011</a:t>
+              <a:t>4/10/2011</a:t>
             </a:fld>
             <a:endParaRPr lang="en-US"/>
           </a:p>
@@ -3542,7 +3545,7 @@
             <a:fld id="{1D8BD707-D9CF-40AE-B4C6-C98DA3205C09}" type="datetimeFigureOut">
               <a:rPr lang="en-US" smtClean="0"/>
               <a:pPr/>
-              <a:t>4/9/2011</a:t>
+              <a:t>4/10/2011</a:t>
             </a:fld>
             <a:endParaRPr lang="en-US"/>
           </a:p>
@@ -4653,7 +4656,7 @@
             <a:fld id="{1D8BD707-D9CF-40AE-B4C6-C98DA3205C09}" type="datetimeFigureOut">
               <a:rPr lang="en-US" smtClean="0"/>
               <a:pPr/>
-              <a:t>4/9/2011</a:t>
+              <a:t>4/10/2011</a:t>
             </a:fld>
             <a:endParaRPr lang="en-US"/>
           </a:p>
@@ -5126,7 +5129,6 @@
               <a:rPr lang="en-US" dirty="0" smtClean="0"/>
               <a:t>Cory Shirts</a:t>
             </a:r>
-            <a:endParaRPr lang="en-US" dirty="0" smtClean="0"/>
           </a:p>
         </p:txBody>
       </p:sp>
@@ -5174,7 +5176,6 @@
               <a:rPr lang="en-US" dirty="0" smtClean="0"/>
               <a:t>Goal: have a user interface to allow user text input using sign language</a:t>
             </a:r>
-            <a:endParaRPr lang="en-US" dirty="0" smtClean="0"/>
           </a:p>
           <a:p>
             <a:pPr lvl="1"/>
@@ -5329,72 +5330,6 @@
       </p:grpSpPr>
       <p:sp>
         <p:nvSpPr>
-          <p:cNvPr id="2" name="Content Placeholder 1"/>
-          <p:cNvSpPr>
-            <a:spLocks noGrp="1"/>
-          </p:cNvSpPr>
-          <p:nvPr>
-            <p:ph idx="1"/>
-          </p:nvPr>
-        </p:nvSpPr>
-        <p:spPr/>
-        <p:txBody>
-          <a:bodyPr/>
-          <a:lstStyle/>
-          <a:p>
-            <a:r>
-              <a:rPr lang="en-US" dirty="0" smtClean="0"/>
-              <a:t>Perform </a:t>
-            </a:r>
-            <a:r>
-              <a:rPr lang="en-US" dirty="0" err="1" smtClean="0"/>
-              <a:t>thresholding</a:t>
-            </a:r>
-            <a:r>
-              <a:rPr lang="en-US" dirty="0" smtClean="0"/>
-              <a:t> on a small ROI (maybe a block diagram here would be better)</a:t>
-            </a:r>
-          </a:p>
-          <a:p>
-            <a:endParaRPr lang="en-US" dirty="0" smtClean="0"/>
-          </a:p>
-          <a:p>
-            <a:r>
-              <a:rPr lang="en-US" dirty="0" smtClean="0"/>
-              <a:t>Match </a:t>
-            </a:r>
-            <a:r>
-              <a:rPr lang="en-US" dirty="0" err="1" smtClean="0"/>
-              <a:t>thresholded</a:t>
-            </a:r>
-            <a:r>
-              <a:rPr lang="en-US" dirty="0" smtClean="0"/>
-              <a:t> templates to this ROI</a:t>
-            </a:r>
-          </a:p>
-          <a:p>
-            <a:endParaRPr lang="en-US" dirty="0" smtClean="0"/>
-          </a:p>
-          <a:p>
-            <a:r>
-              <a:rPr lang="en-US" dirty="0" smtClean="0"/>
-              <a:t>Return the best match or average from a set of templates</a:t>
-            </a:r>
-          </a:p>
-          <a:p>
-            <a:endParaRPr lang="en-US" dirty="0" smtClean="0"/>
-          </a:p>
-          <a:p>
-            <a:r>
-              <a:rPr lang="en-US" dirty="0" smtClean="0"/>
-              <a:t>Result: did not fit well with similar signs</a:t>
-            </a:r>
-            <a:endParaRPr lang="en-US" dirty="0"/>
-          </a:p>
-        </p:txBody>
-      </p:sp>
-      <p:sp>
-        <p:nvSpPr>
           <p:cNvPr id="3" name="Title 2"/>
           <p:cNvSpPr>
             <a:spLocks noGrp="1"/>
@@ -5421,6 +5356,346 @@
           </a:p>
         </p:txBody>
       </p:sp>
+      <p:grpSp>
+        <p:nvGrpSpPr>
+          <p:cNvPr id="15" name="Group 14"/>
+          <p:cNvGrpSpPr/>
+          <p:nvPr/>
+        </p:nvGrpSpPr>
+        <p:grpSpPr>
+          <a:xfrm>
+            <a:off x="2286000" y="1138535"/>
+            <a:ext cx="4191000" cy="4728865"/>
+            <a:chOff x="2057400" y="990600"/>
+            <a:chExt cx="4191000" cy="4728865"/>
+          </a:xfrm>
+        </p:grpSpPr>
+        <p:sp>
+          <p:nvSpPr>
+            <p:cNvPr id="4" name="TextBox 3"/>
+            <p:cNvSpPr txBox="1"/>
+            <p:nvPr/>
+          </p:nvSpPr>
+          <p:spPr>
+            <a:xfrm>
+              <a:off x="2057400" y="3119735"/>
+              <a:ext cx="4191000" cy="461665"/>
+            </a:xfrm>
+            <a:prstGeom prst="rect">
+              <a:avLst/>
+            </a:prstGeom>
+            <a:noFill/>
+            <a:ln>
+              <a:solidFill>
+                <a:schemeClr val="tx1"/>
+              </a:solidFill>
+            </a:ln>
+          </p:spPr>
+          <p:txBody>
+            <a:bodyPr wrap="square" rtlCol="0">
+              <a:spAutoFit/>
+            </a:bodyPr>
+            <a:lstStyle/>
+            <a:p>
+              <a:r>
+                <a:rPr lang="en-US" sz="2400" dirty="0" err="1" smtClean="0"/>
+                <a:t>Thresholding</a:t>
+              </a:r>
+              <a:r>
+                <a:rPr lang="en-US" sz="2400" dirty="0" smtClean="0"/>
+                <a:t> on small ROI</a:t>
+              </a:r>
+              <a:endParaRPr lang="en-US" sz="2400" dirty="0"/>
+            </a:p>
+          </p:txBody>
+        </p:sp>
+        <p:sp>
+          <p:nvSpPr>
+            <p:cNvPr id="5" name="TextBox 4"/>
+            <p:cNvSpPr txBox="1"/>
+            <p:nvPr/>
+          </p:nvSpPr>
+          <p:spPr>
+            <a:xfrm>
+              <a:off x="2819400" y="4191000"/>
+              <a:ext cx="2743200" cy="461665"/>
+            </a:xfrm>
+            <a:prstGeom prst="rect">
+              <a:avLst/>
+            </a:prstGeom>
+            <a:noFill/>
+            <a:ln>
+              <a:solidFill>
+                <a:schemeClr val="tx1"/>
+              </a:solidFill>
+            </a:ln>
+          </p:spPr>
+          <p:txBody>
+            <a:bodyPr wrap="square" rtlCol="0">
+              <a:spAutoFit/>
+            </a:bodyPr>
+            <a:lstStyle/>
+            <a:p>
+              <a:pPr algn="ctr"/>
+              <a:r>
+                <a:rPr lang="en-US" sz="2400" dirty="0" smtClean="0"/>
+                <a:t>Match templates</a:t>
+              </a:r>
+              <a:endParaRPr lang="en-US" sz="2400" dirty="0"/>
+            </a:p>
+          </p:txBody>
+        </p:sp>
+        <p:sp>
+          <p:nvSpPr>
+            <p:cNvPr id="6" name="TextBox 5"/>
+            <p:cNvSpPr txBox="1"/>
+            <p:nvPr/>
+          </p:nvSpPr>
+          <p:spPr>
+            <a:xfrm>
+              <a:off x="2438400" y="5257800"/>
+              <a:ext cx="3429000" cy="461665"/>
+            </a:xfrm>
+            <a:prstGeom prst="rect">
+              <a:avLst/>
+            </a:prstGeom>
+            <a:noFill/>
+            <a:ln>
+              <a:solidFill>
+                <a:schemeClr val="tx1"/>
+              </a:solidFill>
+            </a:ln>
+          </p:spPr>
+          <p:txBody>
+            <a:bodyPr wrap="square" rtlCol="0">
+              <a:spAutoFit/>
+            </a:bodyPr>
+            <a:lstStyle/>
+            <a:p>
+              <a:pPr algn="ctr"/>
+              <a:r>
+                <a:rPr lang="en-US" sz="2400" dirty="0" smtClean="0"/>
+                <a:t>Get the best match</a:t>
+              </a:r>
+              <a:endParaRPr lang="en-US" sz="2400" dirty="0"/>
+            </a:p>
+          </p:txBody>
+        </p:sp>
+        <p:sp>
+          <p:nvSpPr>
+            <p:cNvPr id="7" name="TextBox 6"/>
+            <p:cNvSpPr txBox="1"/>
+            <p:nvPr/>
+          </p:nvSpPr>
+          <p:spPr>
+            <a:xfrm>
+              <a:off x="2819400" y="990600"/>
+              <a:ext cx="2590800" cy="461665"/>
+            </a:xfrm>
+            <a:prstGeom prst="rect">
+              <a:avLst/>
+            </a:prstGeom>
+            <a:noFill/>
+            <a:ln>
+              <a:solidFill>
+                <a:schemeClr val="tx1"/>
+              </a:solidFill>
+            </a:ln>
+          </p:spPr>
+          <p:txBody>
+            <a:bodyPr wrap="square" rtlCol="0">
+              <a:spAutoFit/>
+            </a:bodyPr>
+            <a:lstStyle/>
+            <a:p>
+              <a:r>
+                <a:rPr lang="en-US" sz="2400" dirty="0" smtClean="0"/>
+                <a:t>User enters text</a:t>
+              </a:r>
+              <a:endParaRPr lang="en-US" sz="2400" dirty="0"/>
+            </a:p>
+          </p:txBody>
+        </p:sp>
+        <p:sp>
+          <p:nvSpPr>
+            <p:cNvPr id="8" name="TextBox 7"/>
+            <p:cNvSpPr txBox="1"/>
+            <p:nvPr/>
+          </p:nvSpPr>
+          <p:spPr>
+            <a:xfrm>
+              <a:off x="2667000" y="2052935"/>
+              <a:ext cx="2971800" cy="461665"/>
+            </a:xfrm>
+            <a:prstGeom prst="rect">
+              <a:avLst/>
+            </a:prstGeom>
+            <a:noFill/>
+            <a:ln>
+              <a:solidFill>
+                <a:schemeClr val="tx1"/>
+              </a:solidFill>
+            </a:ln>
+          </p:spPr>
+          <p:txBody>
+            <a:bodyPr wrap="square" rtlCol="0">
+              <a:spAutoFit/>
+            </a:bodyPr>
+            <a:lstStyle/>
+            <a:p>
+              <a:r>
+                <a:rPr lang="en-US" sz="2400" dirty="0" smtClean="0"/>
+                <a:t>Wait for input sign</a:t>
+              </a:r>
+              <a:endParaRPr lang="en-US" sz="2400" dirty="0"/>
+            </a:p>
+          </p:txBody>
+        </p:sp>
+        <p:cxnSp>
+          <p:nvCxnSpPr>
+            <p:cNvPr id="10" name="Straight Arrow Connector 9"/>
+            <p:cNvCxnSpPr/>
+            <p:nvPr/>
+          </p:nvCxnSpPr>
+          <p:spPr>
+            <a:xfrm rot="5400000">
+              <a:off x="3810000" y="1752600"/>
+              <a:ext cx="457200" cy="1588"/>
+            </a:xfrm>
+            <a:prstGeom prst="straightConnector1">
+              <a:avLst/>
+            </a:prstGeom>
+            <a:ln w="25400">
+              <a:solidFill>
+                <a:schemeClr val="tx1"/>
+              </a:solidFill>
+              <a:tailEnd type="arrow"/>
+            </a:ln>
+          </p:spPr>
+          <p:style>
+            <a:lnRef idx="1">
+              <a:schemeClr val="accent1"/>
+            </a:lnRef>
+            <a:fillRef idx="0">
+              <a:schemeClr val="accent1"/>
+            </a:fillRef>
+            <a:effectRef idx="0">
+              <a:schemeClr val="accent1"/>
+            </a:effectRef>
+            <a:fontRef idx="minor">
+              <a:schemeClr val="tx1"/>
+            </a:fontRef>
+          </p:style>
+        </p:cxnSp>
+        <p:cxnSp>
+          <p:nvCxnSpPr>
+            <p:cNvPr id="12" name="Straight Arrow Connector 11"/>
+            <p:cNvCxnSpPr/>
+            <p:nvPr/>
+          </p:nvCxnSpPr>
+          <p:spPr>
+            <a:xfrm rot="5400000">
+              <a:off x="3809205" y="2818606"/>
+              <a:ext cx="457200" cy="1588"/>
+            </a:xfrm>
+            <a:prstGeom prst="straightConnector1">
+              <a:avLst/>
+            </a:prstGeom>
+            <a:ln w="25400">
+              <a:solidFill>
+                <a:schemeClr val="tx1"/>
+              </a:solidFill>
+              <a:tailEnd type="arrow"/>
+            </a:ln>
+          </p:spPr>
+          <p:style>
+            <a:lnRef idx="1">
+              <a:schemeClr val="accent1"/>
+            </a:lnRef>
+            <a:fillRef idx="0">
+              <a:schemeClr val="accent1"/>
+            </a:fillRef>
+            <a:effectRef idx="0">
+              <a:schemeClr val="accent1"/>
+            </a:effectRef>
+            <a:fontRef idx="minor">
+              <a:schemeClr val="tx1"/>
+            </a:fontRef>
+          </p:style>
+        </p:cxnSp>
+        <p:cxnSp>
+          <p:nvCxnSpPr>
+            <p:cNvPr id="13" name="Straight Arrow Connector 12"/>
+            <p:cNvCxnSpPr/>
+            <p:nvPr/>
+          </p:nvCxnSpPr>
+          <p:spPr>
+            <a:xfrm rot="5400000">
+              <a:off x="3810794" y="4952206"/>
+              <a:ext cx="457200" cy="1588"/>
+            </a:xfrm>
+            <a:prstGeom prst="straightConnector1">
+              <a:avLst/>
+            </a:prstGeom>
+            <a:ln w="25400">
+              <a:solidFill>
+                <a:schemeClr val="tx1"/>
+              </a:solidFill>
+              <a:tailEnd type="arrow"/>
+            </a:ln>
+          </p:spPr>
+          <p:style>
+            <a:lnRef idx="1">
+              <a:schemeClr val="accent1"/>
+            </a:lnRef>
+            <a:fillRef idx="0">
+              <a:schemeClr val="accent1"/>
+            </a:fillRef>
+            <a:effectRef idx="0">
+              <a:schemeClr val="accent1"/>
+            </a:effectRef>
+            <a:fontRef idx="minor">
+              <a:schemeClr val="tx1"/>
+            </a:fontRef>
+          </p:style>
+        </p:cxnSp>
+        <p:cxnSp>
+          <p:nvCxnSpPr>
+            <p:cNvPr id="14" name="Straight Arrow Connector 13"/>
+            <p:cNvCxnSpPr/>
+            <p:nvPr/>
+          </p:nvCxnSpPr>
+          <p:spPr>
+            <a:xfrm rot="5400000">
+              <a:off x="3810794" y="3885406"/>
+              <a:ext cx="457200" cy="1588"/>
+            </a:xfrm>
+            <a:prstGeom prst="straightConnector1">
+              <a:avLst/>
+            </a:prstGeom>
+            <a:ln w="25400">
+              <a:solidFill>
+                <a:schemeClr val="tx1"/>
+              </a:solidFill>
+              <a:tailEnd type="arrow"/>
+            </a:ln>
+          </p:spPr>
+          <p:style>
+            <a:lnRef idx="1">
+              <a:schemeClr val="accent1"/>
+            </a:lnRef>
+            <a:fillRef idx="0">
+              <a:schemeClr val="accent1"/>
+            </a:fillRef>
+            <a:effectRef idx="0">
+              <a:schemeClr val="accent1"/>
+            </a:effectRef>
+            <a:fontRef idx="minor">
+              <a:schemeClr val="tx1"/>
+            </a:fontRef>
+          </p:style>
+        </p:cxnSp>
+      </p:grpSp>
     </p:spTree>
   </p:cSld>
   <p:clrMapOvr>
@@ -5461,7 +5736,45 @@
           <a:bodyPr/>
           <a:lstStyle/>
           <a:p>
-            <a:endParaRPr lang="en-US"/>
+            <a:r>
+              <a:rPr lang="en-US" dirty="0" smtClean="0"/>
+              <a:t>Similar signs not distinguishable  with b/w template matching</a:t>
+            </a:r>
+          </a:p>
+          <a:p>
+            <a:pPr lvl="1"/>
+            <a:r>
+              <a:rPr lang="en-US" dirty="0" smtClean="0"/>
+              <a:t>Some min/max values just too close to tell</a:t>
+            </a:r>
+          </a:p>
+          <a:p>
+            <a:pPr lvl="1"/>
+            <a:endParaRPr lang="en-US" dirty="0" smtClean="0"/>
+          </a:p>
+          <a:p>
+            <a:endParaRPr lang="en-US" dirty="0" smtClean="0"/>
+          </a:p>
+          <a:p>
+            <a:r>
+              <a:rPr lang="en-US" dirty="0" smtClean="0"/>
+              <a:t>Template matching with color markers</a:t>
+            </a:r>
+          </a:p>
+          <a:p>
+            <a:pPr lvl="1"/>
+            <a:r>
+              <a:rPr lang="en-US" dirty="0" smtClean="0"/>
+              <a:t>Takes longer to process</a:t>
+            </a:r>
+          </a:p>
+          <a:p>
+            <a:pPr lvl="1"/>
+            <a:r>
+              <a:rPr lang="en-US" dirty="0" smtClean="0"/>
+              <a:t>Not perfect, but more accurate</a:t>
+            </a:r>
+            <a:endParaRPr lang="en-US" dirty="0"/>
           </a:p>
         </p:txBody>
       </p:sp>
@@ -5480,6 +5793,10 @@
           <a:bodyPr/>
           <a:lstStyle/>
           <a:p>
+            <a:r>
+              <a:rPr lang="en-US" dirty="0" smtClean="0"/>
+              <a:t>Adjustments</a:t>
+            </a:r>
             <a:endParaRPr lang="en-US" dirty="0"/>
           </a:p>
         </p:txBody>

</xml_diff>

<commit_message>
adding edits to presentation, I will add some images later
</commit_message>
<xml_diff>
--- a/Winter2011/Presentation/Project Presentation.pptx
+++ b/Winter2011/Presentation/Project Presentation.pptx
@@ -5,7 +5,7 @@
     <p:sldMasterId id="2147483660" r:id="rId1"/>
   </p:sldMasterIdLst>
   <p:notesMasterIdLst>
-    <p:notesMasterId r:id="rId7"/>
+    <p:notesMasterId r:id="rId10"/>
   </p:notesMasterIdLst>
   <p:sldIdLst>
     <p:sldId id="256" r:id="rId2"/>
@@ -13,6 +13,9 @@
     <p:sldId id="258" r:id="rId4"/>
     <p:sldId id="259" r:id="rId5"/>
     <p:sldId id="260" r:id="rId6"/>
+    <p:sldId id="261" r:id="rId7"/>
+    <p:sldId id="262" r:id="rId8"/>
+    <p:sldId id="263" r:id="rId9"/>
   </p:sldIdLst>
   <p:sldSz cx="9144000" cy="6858000" type="screen4x3"/>
   <p:notesSz cx="6858000" cy="9144000"/>
@@ -197,7 +200,7 @@
             <a:fld id="{7337E328-3B00-480B-87D5-0C6EF7B3B765}" type="datetimeFigureOut">
               <a:rPr lang="en-US" smtClean="0"/>
               <a:pPr/>
-              <a:t>4/10/2011</a:t>
+              <a:t>4/11/2011</a:t>
             </a:fld>
             <a:endParaRPr lang="en-US"/>
           </a:p>
@@ -1183,7 +1186,7 @@
             <a:fld id="{1D8BD707-D9CF-40AE-B4C6-C98DA3205C09}" type="datetimeFigureOut">
               <a:rPr lang="en-US" smtClean="0"/>
               <a:pPr/>
-              <a:t>4/10/2011</a:t>
+              <a:t>4/11/2011</a:t>
             </a:fld>
             <a:endParaRPr lang="en-US"/>
           </a:p>
@@ -1381,7 +1384,7 @@
             <a:fld id="{1D8BD707-D9CF-40AE-B4C6-C98DA3205C09}" type="datetimeFigureOut">
               <a:rPr lang="en-US" smtClean="0"/>
               <a:pPr/>
-              <a:t>4/10/2011</a:t>
+              <a:t>4/11/2011</a:t>
             </a:fld>
             <a:endParaRPr lang="en-US"/>
           </a:p>
@@ -1568,7 +1571,7 @@
             <a:fld id="{1D8BD707-D9CF-40AE-B4C6-C98DA3205C09}" type="datetimeFigureOut">
               <a:rPr lang="en-US" smtClean="0"/>
               <a:pPr/>
-              <a:t>4/10/2011</a:t>
+              <a:t>4/11/2011</a:t>
             </a:fld>
             <a:endParaRPr lang="en-US"/>
           </a:p>
@@ -1720,7 +1723,7 @@
             <a:fld id="{1D8BD707-D9CF-40AE-B4C6-C98DA3205C09}" type="datetimeFigureOut">
               <a:rPr lang="en-US" smtClean="0"/>
               <a:pPr/>
-              <a:t>4/10/2011</a:t>
+              <a:t>4/11/2011</a:t>
             </a:fld>
             <a:endParaRPr lang="en-US"/>
           </a:p>
@@ -1977,7 +1980,7 @@
             <a:fld id="{1D8BD707-D9CF-40AE-B4C6-C98DA3205C09}" type="datetimeFigureOut">
               <a:rPr lang="en-US" smtClean="0"/>
               <a:pPr/>
-              <a:t>4/10/2011</a:t>
+              <a:t>4/11/2011</a:t>
             </a:fld>
             <a:endParaRPr lang="en-US"/>
           </a:p>
@@ -2388,7 +2391,7 @@
             <a:fld id="{1D8BD707-D9CF-40AE-B4C6-C98DA3205C09}" type="datetimeFigureOut">
               <a:rPr lang="en-US" smtClean="0"/>
               <a:pPr/>
-              <a:t>4/10/2011</a:t>
+              <a:t>4/11/2011</a:t>
             </a:fld>
             <a:endParaRPr lang="en-US"/>
           </a:p>
@@ -2836,7 +2839,7 @@
             <a:fld id="{1D8BD707-D9CF-40AE-B4C6-C98DA3205C09}" type="datetimeFigureOut">
               <a:rPr lang="en-US" smtClean="0"/>
               <a:pPr/>
-              <a:t>4/10/2011</a:t>
+              <a:t>4/11/2011</a:t>
             </a:fld>
             <a:endParaRPr lang="en-US"/>
           </a:p>
@@ -2939,7 +2942,7 @@
             <a:fld id="{1D8BD707-D9CF-40AE-B4C6-C98DA3205C09}" type="datetimeFigureOut">
               <a:rPr lang="en-US" smtClean="0"/>
               <a:pPr/>
-              <a:t>4/10/2011</a:t>
+              <a:t>4/11/2011</a:t>
             </a:fld>
             <a:endParaRPr lang="en-US"/>
           </a:p>
@@ -3062,7 +3065,7 @@
             <a:fld id="{1D8BD707-D9CF-40AE-B4C6-C98DA3205C09}" type="datetimeFigureOut">
               <a:rPr lang="en-US" smtClean="0"/>
               <a:pPr/>
-              <a:t>4/10/2011</a:t>
+              <a:t>4/11/2011</a:t>
             </a:fld>
             <a:endParaRPr lang="en-US"/>
           </a:p>
@@ -3338,7 +3341,7 @@
             <a:fld id="{1D8BD707-D9CF-40AE-B4C6-C98DA3205C09}" type="datetimeFigureOut">
               <a:rPr lang="en-US" smtClean="0"/>
               <a:pPr/>
-              <a:t>4/10/2011</a:t>
+              <a:t>4/11/2011</a:t>
             </a:fld>
             <a:endParaRPr lang="en-US"/>
           </a:p>
@@ -3545,7 +3548,7 @@
             <a:fld id="{1D8BD707-D9CF-40AE-B4C6-C98DA3205C09}" type="datetimeFigureOut">
               <a:rPr lang="en-US" smtClean="0"/>
               <a:pPr/>
-              <a:t>4/10/2011</a:t>
+              <a:t>4/11/2011</a:t>
             </a:fld>
             <a:endParaRPr lang="en-US"/>
           </a:p>
@@ -4656,7 +4659,7 @@
             <a:fld id="{1D8BD707-D9CF-40AE-B4C6-C98DA3205C09}" type="datetimeFigureOut">
               <a:rPr lang="en-US" smtClean="0"/>
               <a:pPr/>
-              <a:t>4/10/2011</a:t>
+              <a:t>4/11/2011</a:t>
             </a:fld>
             <a:endParaRPr lang="en-US"/>
           </a:p>
@@ -5167,15 +5170,25 @@
             <p:ph idx="1"/>
           </p:nvPr>
         </p:nvSpPr>
-        <p:spPr/>
+        <p:spPr>
+          <a:xfrm>
+            <a:off x="457200" y="1828800"/>
+            <a:ext cx="8229600" cy="4525963"/>
+          </a:xfrm>
+        </p:spPr>
         <p:txBody>
           <a:bodyPr/>
           <a:lstStyle/>
           <a:p>
             <a:r>
               <a:rPr lang="en-US" dirty="0" smtClean="0"/>
-              <a:t>Goal: have a user interface to allow user text input using sign language</a:t>
-            </a:r>
+              <a:t>Goal: have a user interface to allow user text input using sign </a:t>
+            </a:r>
+            <a:r>
+              <a:rPr lang="en-US" dirty="0" smtClean="0"/>
+              <a:t>language digits and letters</a:t>
+            </a:r>
+            <a:endParaRPr lang="en-US" dirty="0" smtClean="0"/>
           </a:p>
           <a:p>
             <a:pPr lvl="1"/>
@@ -5303,6 +5316,30 @@
           </a:p>
         </p:txBody>
       </p:sp>
+      <p:pic>
+        <p:nvPicPr>
+          <p:cNvPr id="4" name="Picture 3" descr="screenshot.jpg"/>
+          <p:cNvPicPr>
+            <a:picLocks noChangeAspect="1"/>
+          </p:cNvPicPr>
+          <p:nvPr/>
+        </p:nvPicPr>
+        <p:blipFill>
+          <a:blip r:embed="rId3" cstate="print"/>
+          <a:stretch>
+            <a:fillRect/>
+          </a:stretch>
+        </p:blipFill>
+        <p:spPr>
+          <a:xfrm>
+            <a:off x="294275" y="1256872"/>
+            <a:ext cx="8468725" cy="4305728"/>
+          </a:xfrm>
+          <a:prstGeom prst="rect">
+            <a:avLst/>
+          </a:prstGeom>
+        </p:spPr>
+      </p:pic>
     </p:spTree>
   </p:cSld>
   <p:clrMapOvr>
@@ -5731,7 +5768,12 @@
             <p:ph idx="1"/>
           </p:nvPr>
         </p:nvSpPr>
-        <p:spPr/>
+        <p:spPr>
+          <a:xfrm>
+            <a:off x="457200" y="1752600"/>
+            <a:ext cx="8229600" cy="4525963"/>
+          </a:xfrm>
+        </p:spPr>
         <p:txBody>
           <a:bodyPr/>
           <a:lstStyle/>
@@ -5742,11 +5784,38 @@
             </a:r>
           </a:p>
           <a:p>
+            <a:endParaRPr lang="en-US" dirty="0" smtClean="0"/>
+          </a:p>
+          <a:p>
+            <a:r>
+              <a:rPr lang="en-US" dirty="0" smtClean="0"/>
+              <a:t>Some </a:t>
+            </a:r>
+            <a:r>
+              <a:rPr lang="en-US" dirty="0" smtClean="0"/>
+              <a:t>min/max values just too close to </a:t>
+            </a:r>
+            <a:r>
+              <a:rPr lang="en-US" dirty="0" smtClean="0"/>
+              <a:t>tell</a:t>
+            </a:r>
+          </a:p>
+          <a:p>
+            <a:endParaRPr lang="en-US" dirty="0" smtClean="0"/>
+          </a:p>
+          <a:p>
+            <a:r>
+              <a:rPr lang="en-US" dirty="0" smtClean="0"/>
+              <a:t>Digits work fine by themselves</a:t>
+            </a:r>
+          </a:p>
+          <a:p>
             <a:pPr lvl="1"/>
             <a:r>
               <a:rPr lang="en-US" dirty="0" smtClean="0"/>
-              <a:t>Some min/max values just too close to tell</a:t>
-            </a:r>
+              <a:t>Most problems introduced when including letters</a:t>
+            </a:r>
+            <a:endParaRPr lang="en-US" dirty="0" smtClean="0"/>
           </a:p>
           <a:p>
             <a:pPr lvl="1"/>
@@ -5755,10 +5824,111 @@
           <a:p>
             <a:endParaRPr lang="en-US" dirty="0" smtClean="0"/>
           </a:p>
+        </p:txBody>
+      </p:sp>
+      <p:sp>
+        <p:nvSpPr>
+          <p:cNvPr id="3" name="Title 2"/>
+          <p:cNvSpPr>
+            <a:spLocks noGrp="1"/>
+          </p:cNvSpPr>
+          <p:nvPr>
+            <p:ph type="title"/>
+          </p:nvPr>
+        </p:nvSpPr>
+        <p:spPr/>
+        <p:txBody>
+          <a:bodyPr/>
+          <a:lstStyle/>
           <a:p>
             <a:r>
               <a:rPr lang="en-US" dirty="0" smtClean="0"/>
-              <a:t>Template matching with color markers</a:t>
+              <a:t>Problems</a:t>
+            </a:r>
+            <a:endParaRPr lang="en-US" dirty="0"/>
+          </a:p>
+        </p:txBody>
+      </p:sp>
+    </p:spTree>
+  </p:cSld>
+  <p:clrMapOvr>
+    <a:masterClrMapping/>
+  </p:clrMapOvr>
+</p:sld>
+</file>
+
+<file path=ppt/slides/slide6.xml><?xml version="1.0" encoding="utf-8"?>
+<p:sld xmlns:a="http://schemas.openxmlformats.org/drawingml/2006/main" xmlns:r="http://schemas.openxmlformats.org/officeDocument/2006/relationships" xmlns:p="http://schemas.openxmlformats.org/presentationml/2006/main">
+  <p:cSld>
+    <p:spTree>
+      <p:nvGrpSpPr>
+        <p:cNvPr id="1" name=""/>
+        <p:cNvGrpSpPr/>
+        <p:nvPr/>
+      </p:nvGrpSpPr>
+      <p:grpSpPr>
+        <a:xfrm>
+          <a:off x="0" y="0"/>
+          <a:ext cx="0" cy="0"/>
+          <a:chOff x="0" y="0"/>
+          <a:chExt cx="0" cy="0"/>
+        </a:xfrm>
+      </p:grpSpPr>
+      <p:sp>
+        <p:nvSpPr>
+          <p:cNvPr id="2" name="Content Placeholder 1"/>
+          <p:cNvSpPr>
+            <a:spLocks noGrp="1"/>
+          </p:cNvSpPr>
+          <p:nvPr>
+            <p:ph idx="1"/>
+          </p:nvPr>
+        </p:nvSpPr>
+        <p:spPr>
+          <a:xfrm>
+            <a:off x="457200" y="1493837"/>
+            <a:ext cx="8229600" cy="4525963"/>
+          </a:xfrm>
+        </p:spPr>
+        <p:txBody>
+          <a:bodyPr>
+            <a:normAutofit/>
+          </a:bodyPr>
+          <a:lstStyle/>
+          <a:p>
+            <a:r>
+              <a:rPr lang="en-US" dirty="0" smtClean="0"/>
+              <a:t>Shape matching</a:t>
+            </a:r>
+          </a:p>
+          <a:p>
+            <a:pPr lvl="1"/>
+            <a:r>
+              <a:rPr lang="en-US" dirty="0" smtClean="0"/>
+              <a:t>Contour based algorithm (B&amp;W)</a:t>
+            </a:r>
+          </a:p>
+          <a:p>
+            <a:pPr lvl="1"/>
+            <a:r>
+              <a:rPr lang="en-US" dirty="0" smtClean="0"/>
+              <a:t>No accuracy improvement over threshold template</a:t>
+            </a:r>
+          </a:p>
+          <a:p>
+            <a:pPr lvl="1">
+              <a:buNone/>
+            </a:pPr>
+            <a:endParaRPr lang="en-US" dirty="0" smtClean="0"/>
+          </a:p>
+          <a:p>
+            <a:r>
+              <a:rPr lang="en-US" dirty="0" smtClean="0"/>
+              <a:t>Template </a:t>
+            </a:r>
+            <a:r>
+              <a:rPr lang="en-US" dirty="0" smtClean="0"/>
+              <a:t>matching with color markers</a:t>
             </a:r>
           </a:p>
           <a:p>
@@ -5772,7 +5942,27 @@
             <a:pPr lvl="1"/>
             <a:r>
               <a:rPr lang="en-US" dirty="0" smtClean="0"/>
-              <a:t>Not perfect, but more accurate</a:t>
+              <a:t>Not perfect, but more </a:t>
+            </a:r>
+            <a:r>
+              <a:rPr lang="en-US" dirty="0" smtClean="0"/>
+              <a:t>accurate</a:t>
+            </a:r>
+          </a:p>
+          <a:p>
+            <a:endParaRPr lang="en-US" dirty="0" smtClean="0"/>
+          </a:p>
+          <a:p>
+            <a:r>
+              <a:rPr lang="en-US" dirty="0" smtClean="0"/>
+              <a:t>Template matching with saturation channels</a:t>
+            </a:r>
+          </a:p>
+          <a:p>
+            <a:pPr lvl="1"/>
+            <a:r>
+              <a:rPr lang="en-US" dirty="0" smtClean="0"/>
+              <a:t>Faster, but less accurate than full color</a:t>
             </a:r>
             <a:endParaRPr lang="en-US" dirty="0"/>
           </a:p>
@@ -5796,6 +5986,200 @@
             <a:r>
               <a:rPr lang="en-US" dirty="0" smtClean="0"/>
               <a:t>Adjustments</a:t>
+            </a:r>
+            <a:endParaRPr lang="en-US" dirty="0"/>
+          </a:p>
+        </p:txBody>
+      </p:sp>
+    </p:spTree>
+  </p:cSld>
+  <p:clrMapOvr>
+    <a:masterClrMapping/>
+  </p:clrMapOvr>
+</p:sld>
+</file>
+
+<file path=ppt/slides/slide7.xml><?xml version="1.0" encoding="utf-8"?>
+<p:sld xmlns:a="http://schemas.openxmlformats.org/drawingml/2006/main" xmlns:r="http://schemas.openxmlformats.org/officeDocument/2006/relationships" xmlns:p="http://schemas.openxmlformats.org/presentationml/2006/main">
+  <p:cSld>
+    <p:spTree>
+      <p:nvGrpSpPr>
+        <p:cNvPr id="1" name=""/>
+        <p:cNvGrpSpPr/>
+        <p:nvPr/>
+      </p:nvGrpSpPr>
+      <p:grpSpPr>
+        <a:xfrm>
+          <a:off x="0" y="0"/>
+          <a:ext cx="0" cy="0"/>
+          <a:chOff x="0" y="0"/>
+          <a:chExt cx="0" cy="0"/>
+        </a:xfrm>
+      </p:grpSpPr>
+      <p:sp>
+        <p:nvSpPr>
+          <p:cNvPr id="2" name="Content Placeholder 1"/>
+          <p:cNvSpPr>
+            <a:spLocks noGrp="1"/>
+          </p:cNvSpPr>
+          <p:nvPr>
+            <p:ph idx="1"/>
+          </p:nvPr>
+        </p:nvSpPr>
+        <p:spPr/>
+        <p:txBody>
+          <a:bodyPr/>
+          <a:lstStyle/>
+          <a:p>
+            <a:r>
+              <a:rPr lang="en-US" dirty="0" smtClean="0"/>
+              <a:t>Template matching on color image</a:t>
+            </a:r>
+          </a:p>
+          <a:p>
+            <a:pPr>
+              <a:buNone/>
+            </a:pPr>
+            <a:endParaRPr lang="en-US" dirty="0" smtClean="0"/>
+          </a:p>
+          <a:p>
+            <a:r>
+              <a:rPr lang="en-US" dirty="0" smtClean="0"/>
+              <a:t>Context checking for similar signs</a:t>
+            </a:r>
+          </a:p>
+          <a:p>
+            <a:pPr lvl="1"/>
+            <a:r>
+              <a:rPr lang="en-US" dirty="0" smtClean="0"/>
+              <a:t>Some signs are the same for two characters</a:t>
+            </a:r>
+          </a:p>
+          <a:p>
+            <a:pPr lvl="1"/>
+            <a:r>
+              <a:rPr lang="en-US" dirty="0" smtClean="0"/>
+              <a:t>Removed some templates for speed up</a:t>
+            </a:r>
+          </a:p>
+          <a:p>
+            <a:pPr>
+              <a:buNone/>
+            </a:pPr>
+            <a:endParaRPr lang="en-US" dirty="0" smtClean="0"/>
+          </a:p>
+          <a:p>
+            <a:r>
+              <a:rPr lang="en-US" dirty="0" smtClean="0"/>
+              <a:t>Distinct hand positions</a:t>
+            </a:r>
+          </a:p>
+          <a:p>
+            <a:pPr lvl="1"/>
+            <a:r>
+              <a:rPr lang="en-US" dirty="0" smtClean="0"/>
+              <a:t>Make difference between similar signs more distinct</a:t>
+            </a:r>
+            <a:endParaRPr lang="en-US" dirty="0"/>
+          </a:p>
+        </p:txBody>
+      </p:sp>
+      <p:sp>
+        <p:nvSpPr>
+          <p:cNvPr id="3" name="Title 2"/>
+          <p:cNvSpPr>
+            <a:spLocks noGrp="1"/>
+          </p:cNvSpPr>
+          <p:nvPr>
+            <p:ph type="title"/>
+          </p:nvPr>
+        </p:nvSpPr>
+        <p:spPr/>
+        <p:txBody>
+          <a:bodyPr/>
+          <a:lstStyle/>
+          <a:p>
+            <a:r>
+              <a:rPr lang="en-US" dirty="0" smtClean="0"/>
+              <a:t>Final algorithm</a:t>
+            </a:r>
+            <a:endParaRPr lang="en-US" dirty="0"/>
+          </a:p>
+        </p:txBody>
+      </p:sp>
+    </p:spTree>
+  </p:cSld>
+  <p:clrMapOvr>
+    <a:masterClrMapping/>
+  </p:clrMapOvr>
+</p:sld>
+</file>
+
+<file path=ppt/slides/slide8.xml><?xml version="1.0" encoding="utf-8"?>
+<p:sld xmlns:a="http://schemas.openxmlformats.org/drawingml/2006/main" xmlns:r="http://schemas.openxmlformats.org/officeDocument/2006/relationships" xmlns:p="http://schemas.openxmlformats.org/presentationml/2006/main">
+  <p:cSld>
+    <p:spTree>
+      <p:nvGrpSpPr>
+        <p:cNvPr id="1" name=""/>
+        <p:cNvGrpSpPr/>
+        <p:nvPr/>
+      </p:nvGrpSpPr>
+      <p:grpSpPr>
+        <a:xfrm>
+          <a:off x="0" y="0"/>
+          <a:ext cx="0" cy="0"/>
+          <a:chOff x="0" y="0"/>
+          <a:chExt cx="0" cy="0"/>
+        </a:xfrm>
+      </p:grpSpPr>
+      <p:pic>
+        <p:nvPicPr>
+          <p:cNvPr id="4" name="Content Placeholder 3" descr="screenshot_final.jpg"/>
+          <p:cNvPicPr>
+            <a:picLocks noGrp="1" noChangeAspect="1"/>
+          </p:cNvPicPr>
+          <p:nvPr>
+            <p:ph idx="1"/>
+          </p:nvPr>
+        </p:nvPicPr>
+        <p:blipFill>
+          <a:blip r:embed="rId2" cstate="print"/>
+          <a:stretch>
+            <a:fillRect/>
+          </a:stretch>
+        </p:blipFill>
+        <p:spPr>
+          <a:xfrm>
+            <a:off x="-1" y="304800"/>
+            <a:ext cx="9125511" cy="4648200"/>
+          </a:xfrm>
+        </p:spPr>
+      </p:pic>
+      <p:sp>
+        <p:nvSpPr>
+          <p:cNvPr id="5" name="TextBox 4"/>
+          <p:cNvSpPr txBox="1"/>
+          <p:nvPr/>
+        </p:nvSpPr>
+        <p:spPr>
+          <a:xfrm>
+            <a:off x="3276600" y="5334000"/>
+            <a:ext cx="3581400" cy="646331"/>
+          </a:xfrm>
+          <a:prstGeom prst="rect">
+            <a:avLst/>
+          </a:prstGeom>
+          <a:noFill/>
+        </p:spPr>
+        <p:txBody>
+          <a:bodyPr wrap="square" rtlCol="0">
+            <a:spAutoFit/>
+          </a:bodyPr>
+          <a:lstStyle/>
+          <a:p>
+            <a:r>
+              <a:rPr lang="en-US" sz="3600" dirty="0" smtClean="0"/>
+              <a:t>Any questions?</a:t>
             </a:r>
             <a:endParaRPr lang="en-US" dirty="0"/>
           </a:p>

</xml_diff>

<commit_message>
added some template images
</commit_message>
<xml_diff>
--- a/Winter2011/Presentation/Project Presentation.pptx
+++ b/Winter2011/Presentation/Project Presentation.pptx
@@ -5182,13 +5182,8 @@
           <a:p>
             <a:r>
               <a:rPr lang="en-US" dirty="0" smtClean="0"/>
-              <a:t>Goal: have a user interface to allow user text input using sign </a:t>
-            </a:r>
-            <a:r>
-              <a:rPr lang="en-US" dirty="0" smtClean="0"/>
-              <a:t>language digits and letters</a:t>
-            </a:r>
-            <a:endParaRPr lang="en-US" dirty="0" smtClean="0"/>
+              <a:t>Goal: have a user interface to allow user text input using sign language digits and letters</a:t>
+            </a:r>
           </a:p>
           <a:p>
             <a:pPr lvl="1"/>
@@ -5770,80 +5765,209 @@
         </p:nvSpPr>
         <p:spPr>
           <a:xfrm>
-            <a:off x="457200" y="1752600"/>
-            <a:ext cx="8229600" cy="4525963"/>
+            <a:off x="457200" y="1143000"/>
+            <a:ext cx="8229600" cy="4876800"/>
           </a:xfrm>
         </p:spPr>
         <p:txBody>
+          <a:bodyPr>
+            <a:normAutofit/>
+          </a:bodyPr>
+          <a:lstStyle/>
+          <a:p>
+            <a:r>
+              <a:rPr lang="en-US" dirty="0" smtClean="0"/>
+              <a:t>Similar signs not distinguishable  with b/w template </a:t>
+            </a:r>
+            <a:r>
+              <a:rPr lang="en-US" dirty="0" smtClean="0"/>
+              <a:t>matching</a:t>
+            </a:r>
+          </a:p>
+          <a:p>
+            <a:pPr>
+              <a:buNone/>
+            </a:pPr>
+            <a:endParaRPr lang="en-US" dirty="0" smtClean="0"/>
+          </a:p>
+          <a:p>
+            <a:endParaRPr lang="en-US" dirty="0" smtClean="0"/>
+          </a:p>
+          <a:p>
+            <a:endParaRPr lang="en-US" dirty="0" smtClean="0"/>
+          </a:p>
+          <a:p>
+            <a:endParaRPr lang="en-US" dirty="0" smtClean="0"/>
+          </a:p>
+          <a:p>
+            <a:r>
+              <a:rPr lang="en-US" dirty="0" smtClean="0"/>
+              <a:t>Some </a:t>
+            </a:r>
+            <a:r>
+              <a:rPr lang="en-US" dirty="0" smtClean="0"/>
+              <a:t>min/max values just too close to tell</a:t>
+            </a:r>
+          </a:p>
+          <a:p>
+            <a:endParaRPr lang="en-US" dirty="0" smtClean="0"/>
+          </a:p>
+          <a:p>
+            <a:r>
+              <a:rPr lang="en-US" dirty="0" smtClean="0"/>
+              <a:t>Digits </a:t>
+            </a:r>
+            <a:r>
+              <a:rPr lang="en-US" dirty="0" smtClean="0"/>
+              <a:t>worked alright </a:t>
+            </a:r>
+            <a:r>
+              <a:rPr lang="en-US" dirty="0" smtClean="0"/>
+              <a:t>by themselves</a:t>
+            </a:r>
+          </a:p>
+          <a:p>
+            <a:pPr lvl="1"/>
+            <a:r>
+              <a:rPr lang="en-US" dirty="0" smtClean="0"/>
+              <a:t>Most problems introduced when including letters</a:t>
+            </a:r>
+          </a:p>
+          <a:p>
+            <a:pPr lvl="1"/>
+            <a:endParaRPr lang="en-US" dirty="0" smtClean="0"/>
+          </a:p>
+          <a:p>
+            <a:endParaRPr lang="en-US" dirty="0" smtClean="0"/>
+          </a:p>
+        </p:txBody>
+      </p:sp>
+      <p:sp>
+        <p:nvSpPr>
+          <p:cNvPr id="3" name="Title 2"/>
+          <p:cNvSpPr>
+            <a:spLocks noGrp="1"/>
+          </p:cNvSpPr>
+          <p:nvPr>
+            <p:ph type="title"/>
+          </p:nvPr>
+        </p:nvSpPr>
+        <p:spPr/>
+        <p:txBody>
           <a:bodyPr/>
           <a:lstStyle/>
           <a:p>
             <a:r>
               <a:rPr lang="en-US" dirty="0" smtClean="0"/>
-              <a:t>Similar signs not distinguishable  with b/w template matching</a:t>
-            </a:r>
-          </a:p>
-          <a:p>
-            <a:endParaRPr lang="en-US" dirty="0" smtClean="0"/>
-          </a:p>
+              <a:t>Problems</a:t>
+            </a:r>
+            <a:endParaRPr lang="en-US" dirty="0"/>
+          </a:p>
+        </p:txBody>
+      </p:sp>
+      <p:pic>
+        <p:nvPicPr>
+          <p:cNvPr id="4" name="Picture 3" descr="0_test.jpg"/>
+          <p:cNvPicPr>
+            <a:picLocks noChangeAspect="1"/>
+          </p:cNvPicPr>
+          <p:nvPr/>
+        </p:nvPicPr>
+        <p:blipFill>
+          <a:blip r:embed="rId2" cstate="print"/>
+          <a:stretch>
+            <a:fillRect/>
+          </a:stretch>
+        </p:blipFill>
+        <p:spPr>
+          <a:xfrm>
+            <a:off x="5943600" y="2057399"/>
+            <a:ext cx="1371601" cy="1371601"/>
+          </a:xfrm>
+          <a:prstGeom prst="rect">
+            <a:avLst/>
+          </a:prstGeom>
+        </p:spPr>
+      </p:pic>
+      <p:pic>
+        <p:nvPicPr>
+          <p:cNvPr id="5" name="Picture 4" descr="0.jpg"/>
+          <p:cNvPicPr>
+            <a:picLocks noChangeAspect="1"/>
+          </p:cNvPicPr>
+          <p:nvPr/>
+        </p:nvPicPr>
+        <p:blipFill>
+          <a:blip r:embed="rId3" cstate="print"/>
+          <a:stretch>
+            <a:fillRect/>
+          </a:stretch>
+        </p:blipFill>
+        <p:spPr>
+          <a:xfrm>
+            <a:off x="2286000" y="2057400"/>
+            <a:ext cx="1295400" cy="1295400"/>
+          </a:xfrm>
+          <a:prstGeom prst="rect">
+            <a:avLst/>
+          </a:prstGeom>
+        </p:spPr>
+      </p:pic>
+      <p:sp>
+        <p:nvSpPr>
+          <p:cNvPr id="7" name="TextBox 6"/>
+          <p:cNvSpPr txBox="1"/>
+          <p:nvPr/>
+        </p:nvSpPr>
+        <p:spPr>
+          <a:xfrm>
+            <a:off x="1143000" y="2514600"/>
+            <a:ext cx="685800" cy="369332"/>
+          </a:xfrm>
+          <a:prstGeom prst="rect">
+            <a:avLst/>
+          </a:prstGeom>
+          <a:noFill/>
+        </p:spPr>
+        <p:txBody>
+          <a:bodyPr wrap="square" rtlCol="0">
+            <a:spAutoFit/>
+          </a:bodyPr>
+          <a:lstStyle/>
           <a:p>
             <a:r>
               <a:rPr lang="en-US" dirty="0" smtClean="0"/>
-              <a:t>Some </a:t>
-            </a:r>
+              <a:t>Zero</a:t>
+            </a:r>
+            <a:endParaRPr lang="en-US" dirty="0"/>
+          </a:p>
+        </p:txBody>
+      </p:sp>
+      <p:sp>
+        <p:nvSpPr>
+          <p:cNvPr id="8" name="TextBox 7"/>
+          <p:cNvSpPr txBox="1"/>
+          <p:nvPr/>
+        </p:nvSpPr>
+        <p:spPr>
+          <a:xfrm>
+            <a:off x="4572000" y="2438400"/>
+            <a:ext cx="1219200" cy="369332"/>
+          </a:xfrm>
+          <a:prstGeom prst="rect">
+            <a:avLst/>
+          </a:prstGeom>
+          <a:noFill/>
+        </p:spPr>
+        <p:txBody>
+          <a:bodyPr wrap="square" rtlCol="0">
+            <a:spAutoFit/>
+          </a:bodyPr>
+          <a:lstStyle/>
+          <a:p>
             <a:r>
               <a:rPr lang="en-US" dirty="0" smtClean="0"/>
-              <a:t>min/max values just too close to </a:t>
-            </a:r>
-            <a:r>
-              <a:rPr lang="en-US" dirty="0" smtClean="0"/>
-              <a:t>tell</a:t>
-            </a:r>
-          </a:p>
-          <a:p>
-            <a:endParaRPr lang="en-US" dirty="0" smtClean="0"/>
-          </a:p>
-          <a:p>
-            <a:r>
-              <a:rPr lang="en-US" dirty="0" smtClean="0"/>
-              <a:t>Digits work fine by themselves</a:t>
-            </a:r>
-          </a:p>
-          <a:p>
-            <a:pPr lvl="1"/>
-            <a:r>
-              <a:rPr lang="en-US" dirty="0" smtClean="0"/>
-              <a:t>Most problems introduced when including letters</a:t>
-            </a:r>
-            <a:endParaRPr lang="en-US" dirty="0" smtClean="0"/>
-          </a:p>
-          <a:p>
-            <a:pPr lvl="1"/>
-            <a:endParaRPr lang="en-US" dirty="0" smtClean="0"/>
-          </a:p>
-          <a:p>
-            <a:endParaRPr lang="en-US" dirty="0" smtClean="0"/>
-          </a:p>
-        </p:txBody>
-      </p:sp>
-      <p:sp>
-        <p:nvSpPr>
-          <p:cNvPr id="3" name="Title 2"/>
-          <p:cNvSpPr>
-            <a:spLocks noGrp="1"/>
-          </p:cNvSpPr>
-          <p:nvPr>
-            <p:ph type="title"/>
-          </p:nvPr>
-        </p:nvSpPr>
-        <p:spPr/>
-        <p:txBody>
-          <a:bodyPr/>
-          <a:lstStyle/>
-          <a:p>
-            <a:r>
-              <a:rPr lang="en-US" dirty="0" smtClean="0"/>
-              <a:t>Problems</a:t>
+              <a:t>Letter o</a:t>
             </a:r>
             <a:endParaRPr lang="en-US" dirty="0"/>
           </a:p>
@@ -5924,11 +6048,7 @@
           <a:p>
             <a:r>
               <a:rPr lang="en-US" dirty="0" smtClean="0"/>
-              <a:t>Template </a:t>
-            </a:r>
-            <a:r>
-              <a:rPr lang="en-US" dirty="0" smtClean="0"/>
-              <a:t>matching with color markers</a:t>
+              <a:t>Template matching with color markers</a:t>
             </a:r>
           </a:p>
           <a:p>
@@ -5942,11 +6062,7 @@
             <a:pPr lvl="1"/>
             <a:r>
               <a:rPr lang="en-US" dirty="0" smtClean="0"/>
-              <a:t>Not perfect, but more </a:t>
-            </a:r>
-            <a:r>
-              <a:rPr lang="en-US" dirty="0" smtClean="0"/>
-              <a:t>accurate</a:t>
+              <a:t>Not perfect, but more accurate</a:t>
             </a:r>
           </a:p>
           <a:p>
@@ -6150,7 +6266,7 @@
         </p:blipFill>
         <p:spPr>
           <a:xfrm>
-            <a:off x="-1" y="304800"/>
+            <a:off x="-1" y="457200"/>
             <a:ext cx="9125511" cy="4648200"/>
           </a:xfrm>
         </p:spPr>

</xml_diff>

<commit_message>
Small updates on adjustments page
</commit_message>
<xml_diff>
--- a/Winter2011/Presentation/Project Presentation.pptx
+++ b/Winter2011/Presentation/Project Presentation.pptx
@@ -5,7 +5,7 @@
     <p:sldMasterId id="2147483660" r:id="rId1"/>
   </p:sldMasterIdLst>
   <p:notesMasterIdLst>
-    <p:notesMasterId r:id="rId10"/>
+    <p:notesMasterId r:id="rId11"/>
   </p:notesMasterIdLst>
   <p:sldIdLst>
     <p:sldId id="256" r:id="rId2"/>
@@ -15,7 +15,8 @@
     <p:sldId id="260" r:id="rId6"/>
     <p:sldId id="261" r:id="rId7"/>
     <p:sldId id="262" r:id="rId8"/>
-    <p:sldId id="263" r:id="rId9"/>
+    <p:sldId id="264" r:id="rId9"/>
+    <p:sldId id="263" r:id="rId10"/>
   </p:sldIdLst>
   <p:sldSz cx="9144000" cy="6858000" type="screen4x3"/>
   <p:notesSz cx="6858000" cy="9144000"/>
@@ -200,7 +201,7 @@
             <a:fld id="{7337E328-3B00-480B-87D5-0C6EF7B3B765}" type="datetimeFigureOut">
               <a:rPr lang="en-US" smtClean="0"/>
               <a:pPr/>
-              <a:t>4/11/2011</a:t>
+              <a:t>4/12/2011</a:t>
             </a:fld>
             <a:endParaRPr lang="en-US"/>
           </a:p>
@@ -1186,7 +1187,7 @@
             <a:fld id="{1D8BD707-D9CF-40AE-B4C6-C98DA3205C09}" type="datetimeFigureOut">
               <a:rPr lang="en-US" smtClean="0"/>
               <a:pPr/>
-              <a:t>4/11/2011</a:t>
+              <a:t>4/12/2011</a:t>
             </a:fld>
             <a:endParaRPr lang="en-US"/>
           </a:p>
@@ -1384,7 +1385,7 @@
             <a:fld id="{1D8BD707-D9CF-40AE-B4C6-C98DA3205C09}" type="datetimeFigureOut">
               <a:rPr lang="en-US" smtClean="0"/>
               <a:pPr/>
-              <a:t>4/11/2011</a:t>
+              <a:t>4/12/2011</a:t>
             </a:fld>
             <a:endParaRPr lang="en-US"/>
           </a:p>
@@ -1571,7 +1572,7 @@
             <a:fld id="{1D8BD707-D9CF-40AE-B4C6-C98DA3205C09}" type="datetimeFigureOut">
               <a:rPr lang="en-US" smtClean="0"/>
               <a:pPr/>
-              <a:t>4/11/2011</a:t>
+              <a:t>4/12/2011</a:t>
             </a:fld>
             <a:endParaRPr lang="en-US"/>
           </a:p>
@@ -1723,7 +1724,7 @@
             <a:fld id="{1D8BD707-D9CF-40AE-B4C6-C98DA3205C09}" type="datetimeFigureOut">
               <a:rPr lang="en-US" smtClean="0"/>
               <a:pPr/>
-              <a:t>4/11/2011</a:t>
+              <a:t>4/12/2011</a:t>
             </a:fld>
             <a:endParaRPr lang="en-US"/>
           </a:p>
@@ -1980,7 +1981,7 @@
             <a:fld id="{1D8BD707-D9CF-40AE-B4C6-C98DA3205C09}" type="datetimeFigureOut">
               <a:rPr lang="en-US" smtClean="0"/>
               <a:pPr/>
-              <a:t>4/11/2011</a:t>
+              <a:t>4/12/2011</a:t>
             </a:fld>
             <a:endParaRPr lang="en-US"/>
           </a:p>
@@ -2391,7 +2392,7 @@
             <a:fld id="{1D8BD707-D9CF-40AE-B4C6-C98DA3205C09}" type="datetimeFigureOut">
               <a:rPr lang="en-US" smtClean="0"/>
               <a:pPr/>
-              <a:t>4/11/2011</a:t>
+              <a:t>4/12/2011</a:t>
             </a:fld>
             <a:endParaRPr lang="en-US"/>
           </a:p>
@@ -2839,7 +2840,7 @@
             <a:fld id="{1D8BD707-D9CF-40AE-B4C6-C98DA3205C09}" type="datetimeFigureOut">
               <a:rPr lang="en-US" smtClean="0"/>
               <a:pPr/>
-              <a:t>4/11/2011</a:t>
+              <a:t>4/12/2011</a:t>
             </a:fld>
             <a:endParaRPr lang="en-US"/>
           </a:p>
@@ -2942,7 +2943,7 @@
             <a:fld id="{1D8BD707-D9CF-40AE-B4C6-C98DA3205C09}" type="datetimeFigureOut">
               <a:rPr lang="en-US" smtClean="0"/>
               <a:pPr/>
-              <a:t>4/11/2011</a:t>
+              <a:t>4/12/2011</a:t>
             </a:fld>
             <a:endParaRPr lang="en-US"/>
           </a:p>
@@ -3065,7 +3066,7 @@
             <a:fld id="{1D8BD707-D9CF-40AE-B4C6-C98DA3205C09}" type="datetimeFigureOut">
               <a:rPr lang="en-US" smtClean="0"/>
               <a:pPr/>
-              <a:t>4/11/2011</a:t>
+              <a:t>4/12/2011</a:t>
             </a:fld>
             <a:endParaRPr lang="en-US"/>
           </a:p>
@@ -3341,7 +3342,7 @@
             <a:fld id="{1D8BD707-D9CF-40AE-B4C6-C98DA3205C09}" type="datetimeFigureOut">
               <a:rPr lang="en-US" smtClean="0"/>
               <a:pPr/>
-              <a:t>4/11/2011</a:t>
+              <a:t>4/12/2011</a:t>
             </a:fld>
             <a:endParaRPr lang="en-US"/>
           </a:p>
@@ -3548,7 +3549,7 @@
             <a:fld id="{1D8BD707-D9CF-40AE-B4C6-C98DA3205C09}" type="datetimeFigureOut">
               <a:rPr lang="en-US" smtClean="0"/>
               <a:pPr/>
-              <a:t>4/11/2011</a:t>
+              <a:t>4/12/2011</a:t>
             </a:fld>
             <a:endParaRPr lang="en-US"/>
           </a:p>
@@ -4659,7 +4660,7 @@
             <a:fld id="{1D8BD707-D9CF-40AE-B4C6-C98DA3205C09}" type="datetimeFigureOut">
               <a:rPr lang="en-US" smtClean="0"/>
               <a:pPr/>
-              <a:t>4/11/2011</a:t>
+              <a:t>4/12/2011</a:t>
             </a:fld>
             <a:endParaRPr lang="en-US"/>
           </a:p>
@@ -5084,13 +5085,23 @@
           </a:xfrm>
         </p:spPr>
         <p:txBody>
-          <a:bodyPr/>
+          <a:bodyPr>
+            <a:normAutofit fontScale="90000"/>
+          </a:bodyPr>
           <a:lstStyle/>
           <a:p>
             <a:pPr algn="ctr"/>
             <a:r>
-              <a:rPr lang="en-US" dirty="0" smtClean="0"/>
-              <a:t>Sign Language Recognition</a:t>
+              <a:rPr lang="en-US" b="0" dirty="0" smtClean="0"/>
+              <a:t>A Visual Password Recognition Application Based On </a:t>
+            </a:r>
+            <a:r>
+              <a:rPr lang="en-US" b="0" dirty="0" smtClean="0"/>
+              <a:t>American </a:t>
+            </a:r>
+            <a:r>
+              <a:rPr lang="en-US" b="0" dirty="0" smtClean="0"/>
+              <a:t>Sign Language</a:t>
             </a:r>
             <a:endParaRPr lang="en-US" dirty="0"/>
           </a:p>
@@ -5777,11 +5788,7 @@
           <a:p>
             <a:r>
               <a:rPr lang="en-US" dirty="0" smtClean="0"/>
-              <a:t>Similar signs not distinguishable  with b/w template </a:t>
-            </a:r>
-            <a:r>
-              <a:rPr lang="en-US" dirty="0" smtClean="0"/>
-              <a:t>matching</a:t>
+              <a:t>Similar signs not distinguishable  with b/w template matching</a:t>
             </a:r>
           </a:p>
           <a:p>
@@ -5802,28 +5809,16 @@
           <a:p>
             <a:r>
               <a:rPr lang="en-US" dirty="0" smtClean="0"/>
-              <a:t>Some </a:t>
-            </a:r>
+              <a:t>Some min/max values just too close to tell</a:t>
+            </a:r>
+          </a:p>
+          <a:p>
+            <a:endParaRPr lang="en-US" dirty="0" smtClean="0"/>
+          </a:p>
+          <a:p>
             <a:r>
               <a:rPr lang="en-US" dirty="0" smtClean="0"/>
-              <a:t>min/max values just too close to tell</a:t>
-            </a:r>
-          </a:p>
-          <a:p>
-            <a:endParaRPr lang="en-US" dirty="0" smtClean="0"/>
-          </a:p>
-          <a:p>
-            <a:r>
-              <a:rPr lang="en-US" dirty="0" smtClean="0"/>
-              <a:t>Digits </a:t>
-            </a:r>
-            <a:r>
-              <a:rPr lang="en-US" dirty="0" smtClean="0"/>
-              <a:t>worked alright </a:t>
-            </a:r>
-            <a:r>
-              <a:rPr lang="en-US" dirty="0" smtClean="0"/>
-              <a:t>by themselves</a:t>
+              <a:t>Digits worked alright by themselves</a:t>
             </a:r>
           </a:p>
           <a:p>
@@ -6016,7 +6011,7 @@
         </p:spPr>
         <p:txBody>
           <a:bodyPr>
-            <a:normAutofit/>
+            <a:normAutofit lnSpcReduction="10000"/>
           </a:bodyPr>
           <a:lstStyle/>
           <a:p>
@@ -6036,13 +6031,12 @@
             <a:pPr lvl="1"/>
             <a:r>
               <a:rPr lang="en-US" dirty="0" smtClean="0"/>
-              <a:t>No accuracy improvement over threshold template</a:t>
-            </a:r>
-          </a:p>
-          <a:p>
-            <a:pPr lvl="1">
-              <a:buNone/>
-            </a:pPr>
+              <a:t>No accuracy improvement over threshold </a:t>
+            </a:r>
+            <a:r>
+              <a:rPr lang="en-US" dirty="0" smtClean="0"/>
+              <a:t>template</a:t>
+            </a:r>
             <a:endParaRPr lang="en-US" dirty="0" smtClean="0"/>
           </a:p>
           <a:p>
@@ -6062,10 +6056,12 @@
             <a:pPr lvl="1"/>
             <a:r>
               <a:rPr lang="en-US" dirty="0" smtClean="0"/>
-              <a:t>Not perfect, but more accurate</a:t>
-            </a:r>
-          </a:p>
-          <a:p>
+              <a:t>Not perfect, but more </a:t>
+            </a:r>
+            <a:r>
+              <a:rPr lang="en-US" dirty="0" smtClean="0"/>
+              <a:t>accurate</a:t>
+            </a:r>
             <a:endParaRPr lang="en-US" dirty="0" smtClean="0"/>
           </a:p>
           <a:p>
@@ -6078,7 +6074,24 @@
             <a:pPr lvl="1"/>
             <a:r>
               <a:rPr lang="en-US" dirty="0" smtClean="0"/>
-              <a:t>Faster, but less accurate than full color</a:t>
+              <a:t>Faster, but less accurate than full </a:t>
+            </a:r>
+            <a:r>
+              <a:rPr lang="en-US" dirty="0" smtClean="0"/>
+              <a:t>color</a:t>
+            </a:r>
+          </a:p>
+          <a:p>
+            <a:r>
+              <a:rPr lang="en-US" dirty="0" smtClean="0"/>
+              <a:t>Histogram comparison</a:t>
+            </a:r>
+          </a:p>
+          <a:p>
+            <a:pPr lvl="1"/>
+            <a:r>
+              <a:rPr lang="en-US" dirty="0" smtClean="0"/>
+              <a:t>Not accurate, but could be useful along with other techniques</a:t>
             </a:r>
             <a:endParaRPr lang="en-US" dirty="0"/>
           </a:p>
@@ -6232,6 +6245,117 @@
 </file>
 
 <file path=ppt/slides/slide8.xml><?xml version="1.0" encoding="utf-8"?>
+<p:sld xmlns:a="http://schemas.openxmlformats.org/drawingml/2006/main" xmlns:r="http://schemas.openxmlformats.org/officeDocument/2006/relationships" xmlns:p="http://schemas.openxmlformats.org/presentationml/2006/main">
+  <p:cSld>
+    <p:spTree>
+      <p:nvGrpSpPr>
+        <p:cNvPr id="1" name=""/>
+        <p:cNvGrpSpPr/>
+        <p:nvPr/>
+      </p:nvGrpSpPr>
+      <p:grpSpPr>
+        <a:xfrm>
+          <a:off x="0" y="0"/>
+          <a:ext cx="0" cy="0"/>
+          <a:chOff x="0" y="0"/>
+          <a:chExt cx="0" cy="0"/>
+        </a:xfrm>
+      </p:grpSpPr>
+      <p:sp>
+        <p:nvSpPr>
+          <p:cNvPr id="2" name="Content Placeholder 1"/>
+          <p:cNvSpPr>
+            <a:spLocks noGrp="1"/>
+          </p:cNvSpPr>
+          <p:nvPr>
+            <p:ph idx="1"/>
+          </p:nvPr>
+        </p:nvSpPr>
+        <p:spPr/>
+        <p:txBody>
+          <a:bodyPr/>
+          <a:lstStyle/>
+          <a:p>
+            <a:r>
+              <a:rPr lang="en-US" dirty="0" smtClean="0"/>
+              <a:t>Improve speed by matching on single channel</a:t>
+            </a:r>
+          </a:p>
+          <a:p>
+            <a:pPr lvl="1"/>
+            <a:r>
+              <a:rPr lang="en-US" dirty="0" smtClean="0"/>
+              <a:t>Saturation of HSV</a:t>
+            </a:r>
+          </a:p>
+          <a:p>
+            <a:pPr lvl="1"/>
+            <a:r>
+              <a:rPr lang="en-US" dirty="0" smtClean="0"/>
+              <a:t>Possibly other color space channel</a:t>
+            </a:r>
+          </a:p>
+          <a:p>
+            <a:endParaRPr lang="en-US" dirty="0" smtClean="0"/>
+          </a:p>
+          <a:p>
+            <a:r>
+              <a:rPr lang="en-US" dirty="0" smtClean="0"/>
+              <a:t>Could try training with </a:t>
+            </a:r>
+            <a:r>
+              <a:rPr lang="en-US" dirty="0" err="1" smtClean="0"/>
+              <a:t>Haar</a:t>
+            </a:r>
+            <a:r>
+              <a:rPr lang="en-US" dirty="0" smtClean="0"/>
+              <a:t> training method</a:t>
+            </a:r>
+          </a:p>
+          <a:p>
+            <a:endParaRPr lang="en-US" dirty="0" smtClean="0"/>
+          </a:p>
+          <a:p>
+            <a:r>
+              <a:rPr lang="en-US" dirty="0" smtClean="0"/>
+              <a:t>Averaging across templates or multiple methods</a:t>
+            </a:r>
+            <a:endParaRPr lang="en-US" dirty="0"/>
+          </a:p>
+        </p:txBody>
+      </p:sp>
+      <p:sp>
+        <p:nvSpPr>
+          <p:cNvPr id="3" name="Title 2"/>
+          <p:cNvSpPr>
+            <a:spLocks noGrp="1"/>
+          </p:cNvSpPr>
+          <p:nvPr>
+            <p:ph type="title"/>
+          </p:nvPr>
+        </p:nvSpPr>
+        <p:spPr/>
+        <p:txBody>
+          <a:bodyPr/>
+          <a:lstStyle/>
+          <a:p>
+            <a:r>
+              <a:rPr lang="en-US" dirty="0" smtClean="0"/>
+              <a:t>Future Adjustments</a:t>
+            </a:r>
+            <a:endParaRPr lang="en-US" dirty="0"/>
+          </a:p>
+        </p:txBody>
+      </p:sp>
+    </p:spTree>
+  </p:cSld>
+  <p:clrMapOvr>
+    <a:masterClrMapping/>
+  </p:clrMapOvr>
+</p:sld>
+</file>
+
+<file path=ppt/slides/slide9.xml><?xml version="1.0" encoding="utf-8"?>
 <p:sld xmlns:a="http://schemas.openxmlformats.org/drawingml/2006/main" xmlns:r="http://schemas.openxmlformats.org/officeDocument/2006/relationships" xmlns:p="http://schemas.openxmlformats.org/presentationml/2006/main">
   <p:cSld>
     <p:spTree>

</xml_diff>

<commit_message>
the final version of the presentation if anybody wants it
</commit_message>
<xml_diff>
--- a/Winter2011/Presentation/Project Presentation.pptx
+++ b/Winter2011/Presentation/Project Presentation.pptx
@@ -201,7 +201,7 @@
             <a:fld id="{7337E328-3B00-480B-87D5-0C6EF7B3B765}" type="datetimeFigureOut">
               <a:rPr lang="en-US" smtClean="0"/>
               <a:pPr/>
-              <a:t>4/12/2011</a:t>
+              <a:t>4/20/2011</a:t>
             </a:fld>
             <a:endParaRPr lang="en-US"/>
           </a:p>
@@ -1187,7 +1187,7 @@
             <a:fld id="{1D8BD707-D9CF-40AE-B4C6-C98DA3205C09}" type="datetimeFigureOut">
               <a:rPr lang="en-US" smtClean="0"/>
               <a:pPr/>
-              <a:t>4/12/2011</a:t>
+              <a:t>4/20/2011</a:t>
             </a:fld>
             <a:endParaRPr lang="en-US"/>
           </a:p>
@@ -1385,7 +1385,7 @@
             <a:fld id="{1D8BD707-D9CF-40AE-B4C6-C98DA3205C09}" type="datetimeFigureOut">
               <a:rPr lang="en-US" smtClean="0"/>
               <a:pPr/>
-              <a:t>4/12/2011</a:t>
+              <a:t>4/20/2011</a:t>
             </a:fld>
             <a:endParaRPr lang="en-US"/>
           </a:p>
@@ -1572,7 +1572,7 @@
             <a:fld id="{1D8BD707-D9CF-40AE-B4C6-C98DA3205C09}" type="datetimeFigureOut">
               <a:rPr lang="en-US" smtClean="0"/>
               <a:pPr/>
-              <a:t>4/12/2011</a:t>
+              <a:t>4/20/2011</a:t>
             </a:fld>
             <a:endParaRPr lang="en-US"/>
           </a:p>
@@ -1724,7 +1724,7 @@
             <a:fld id="{1D8BD707-D9CF-40AE-B4C6-C98DA3205C09}" type="datetimeFigureOut">
               <a:rPr lang="en-US" smtClean="0"/>
               <a:pPr/>
-              <a:t>4/12/2011</a:t>
+              <a:t>4/20/2011</a:t>
             </a:fld>
             <a:endParaRPr lang="en-US"/>
           </a:p>
@@ -1981,7 +1981,7 @@
             <a:fld id="{1D8BD707-D9CF-40AE-B4C6-C98DA3205C09}" type="datetimeFigureOut">
               <a:rPr lang="en-US" smtClean="0"/>
               <a:pPr/>
-              <a:t>4/12/2011</a:t>
+              <a:t>4/20/2011</a:t>
             </a:fld>
             <a:endParaRPr lang="en-US"/>
           </a:p>
@@ -2392,7 +2392,7 @@
             <a:fld id="{1D8BD707-D9CF-40AE-B4C6-C98DA3205C09}" type="datetimeFigureOut">
               <a:rPr lang="en-US" smtClean="0"/>
               <a:pPr/>
-              <a:t>4/12/2011</a:t>
+              <a:t>4/20/2011</a:t>
             </a:fld>
             <a:endParaRPr lang="en-US"/>
           </a:p>
@@ -2840,7 +2840,7 @@
             <a:fld id="{1D8BD707-D9CF-40AE-B4C6-C98DA3205C09}" type="datetimeFigureOut">
               <a:rPr lang="en-US" smtClean="0"/>
               <a:pPr/>
-              <a:t>4/12/2011</a:t>
+              <a:t>4/20/2011</a:t>
             </a:fld>
             <a:endParaRPr lang="en-US"/>
           </a:p>
@@ -2943,7 +2943,7 @@
             <a:fld id="{1D8BD707-D9CF-40AE-B4C6-C98DA3205C09}" type="datetimeFigureOut">
               <a:rPr lang="en-US" smtClean="0"/>
               <a:pPr/>
-              <a:t>4/12/2011</a:t>
+              <a:t>4/20/2011</a:t>
             </a:fld>
             <a:endParaRPr lang="en-US"/>
           </a:p>
@@ -3066,7 +3066,7 @@
             <a:fld id="{1D8BD707-D9CF-40AE-B4C6-C98DA3205C09}" type="datetimeFigureOut">
               <a:rPr lang="en-US" smtClean="0"/>
               <a:pPr/>
-              <a:t>4/12/2011</a:t>
+              <a:t>4/20/2011</a:t>
             </a:fld>
             <a:endParaRPr lang="en-US"/>
           </a:p>
@@ -3342,7 +3342,7 @@
             <a:fld id="{1D8BD707-D9CF-40AE-B4C6-C98DA3205C09}" type="datetimeFigureOut">
               <a:rPr lang="en-US" smtClean="0"/>
               <a:pPr/>
-              <a:t>4/12/2011</a:t>
+              <a:t>4/20/2011</a:t>
             </a:fld>
             <a:endParaRPr lang="en-US"/>
           </a:p>
@@ -3549,7 +3549,7 @@
             <a:fld id="{1D8BD707-D9CF-40AE-B4C6-C98DA3205C09}" type="datetimeFigureOut">
               <a:rPr lang="en-US" smtClean="0"/>
               <a:pPr/>
-              <a:t>4/12/2011</a:t>
+              <a:t>4/20/2011</a:t>
             </a:fld>
             <a:endParaRPr lang="en-US"/>
           </a:p>
@@ -4660,7 +4660,7 @@
             <a:fld id="{1D8BD707-D9CF-40AE-B4C6-C98DA3205C09}" type="datetimeFigureOut">
               <a:rPr lang="en-US" smtClean="0"/>
               <a:pPr/>
-              <a:t>4/12/2011</a:t>
+              <a:t>4/20/2011</a:t>
             </a:fld>
             <a:endParaRPr lang="en-US"/>
           </a:p>
@@ -5093,15 +5093,7 @@
             <a:pPr algn="ctr"/>
             <a:r>
               <a:rPr lang="en-US" b="0" dirty="0" smtClean="0"/>
-              <a:t>A Visual Password Recognition Application Based On </a:t>
-            </a:r>
-            <a:r>
-              <a:rPr lang="en-US" b="0" dirty="0" smtClean="0"/>
-              <a:t>American </a:t>
-            </a:r>
-            <a:r>
-              <a:rPr lang="en-US" b="0" dirty="0" smtClean="0"/>
-              <a:t>Sign Language</a:t>
+              <a:t>A Visual Password Recognition Application Based On American Sign Language</a:t>
             </a:r>
             <a:endParaRPr lang="en-US" dirty="0"/>
           </a:p>
@@ -5151,6 +5143,13 @@
   <p:clrMapOvr>
     <a:masterClrMapping/>
   </p:clrMapOvr>
+  <p:timing>
+    <p:tnLst>
+      <p:par>
+        <p:cTn id="1" dur="indefinite" restart="never" nodeType="tmRoot"/>
+      </p:par>
+    </p:tnLst>
+  </p:timing>
 </p:sld>
 </file>
 
@@ -5256,6 +5255,13 @@
   <p:clrMapOvr>
     <a:masterClrMapping/>
   </p:clrMapOvr>
+  <p:timing>
+    <p:tnLst>
+      <p:par>
+        <p:cTn id="1" dur="indefinite" restart="never" nodeType="tmRoot"/>
+      </p:par>
+    </p:tnLst>
+  </p:timing>
 </p:sld>
 </file>
 
@@ -5351,6 +5357,13 @@
   <p:clrMapOvr>
     <a:masterClrMapping/>
   </p:clrMapOvr>
+  <p:timing>
+    <p:tnLst>
+      <p:par>
+        <p:cTn id="1" dur="indefinite" restart="never" nodeType="tmRoot"/>
+      </p:par>
+    </p:tnLst>
+  </p:timing>
 </p:sld>
 </file>
 
@@ -5744,6 +5757,13 @@
   <p:clrMapOvr>
     <a:masterClrMapping/>
   </p:clrMapOvr>
+  <p:timing>
+    <p:tnLst>
+      <p:par>
+        <p:cTn id="1" dur="indefinite" restart="never" nodeType="tmRoot"/>
+      </p:par>
+    </p:tnLst>
+  </p:timing>
 </p:sld>
 </file>
 
@@ -5973,6 +5993,13 @@
   <p:clrMapOvr>
     <a:masterClrMapping/>
   </p:clrMapOvr>
+  <p:timing>
+    <p:tnLst>
+      <p:par>
+        <p:cTn id="1" dur="indefinite" restart="never" nodeType="tmRoot"/>
+      </p:par>
+    </p:tnLst>
+  </p:timing>
 </p:sld>
 </file>
 
@@ -6031,13 +6058,8 @@
             <a:pPr lvl="1"/>
             <a:r>
               <a:rPr lang="en-US" dirty="0" smtClean="0"/>
-              <a:t>No accuracy improvement over threshold </a:t>
-            </a:r>
-            <a:r>
-              <a:rPr lang="en-US" dirty="0" smtClean="0"/>
-              <a:t>template</a:t>
-            </a:r>
-            <a:endParaRPr lang="en-US" dirty="0" smtClean="0"/>
+              <a:t>No accuracy improvement over threshold template</a:t>
+            </a:r>
           </a:p>
           <a:p>
             <a:r>
@@ -6056,13 +6078,8 @@
             <a:pPr lvl="1"/>
             <a:r>
               <a:rPr lang="en-US" dirty="0" smtClean="0"/>
-              <a:t>Not perfect, but more </a:t>
-            </a:r>
-            <a:r>
-              <a:rPr lang="en-US" dirty="0" smtClean="0"/>
-              <a:t>accurate</a:t>
-            </a:r>
-            <a:endParaRPr lang="en-US" dirty="0" smtClean="0"/>
+              <a:t>Not perfect, but more accurate</a:t>
+            </a:r>
           </a:p>
           <a:p>
             <a:r>
@@ -6074,11 +6091,7 @@
             <a:pPr lvl="1"/>
             <a:r>
               <a:rPr lang="en-US" dirty="0" smtClean="0"/>
-              <a:t>Faster, but less accurate than full </a:t>
-            </a:r>
-            <a:r>
-              <a:rPr lang="en-US" dirty="0" smtClean="0"/>
-              <a:t>color</a:t>
+              <a:t>Faster, but less accurate than full color</a:t>
             </a:r>
           </a:p>
           <a:p>
@@ -6125,6 +6138,13 @@
   <p:clrMapOvr>
     <a:masterClrMapping/>
   </p:clrMapOvr>
+  <p:timing>
+    <p:tnLst>
+      <p:par>
+        <p:cTn id="1" dur="indefinite" restart="never" nodeType="tmRoot"/>
+      </p:par>
+    </p:tnLst>
+  </p:timing>
 </p:sld>
 </file>
 
@@ -6236,11 +6256,66 @@
           </a:p>
         </p:txBody>
       </p:sp>
+      <p:pic>
+        <p:nvPicPr>
+          <p:cNvPr id="4" name="Picture 3" descr="m_5.jpg"/>
+          <p:cNvPicPr>
+            <a:picLocks noChangeAspect="1"/>
+          </p:cNvPicPr>
+          <p:nvPr/>
+        </p:nvPicPr>
+        <p:blipFill>
+          <a:blip r:embed="rId2" cstate="print"/>
+          <a:stretch>
+            <a:fillRect/>
+          </a:stretch>
+        </p:blipFill>
+        <p:spPr>
+          <a:xfrm>
+            <a:off x="4495800" y="5105400"/>
+            <a:ext cx="1524000" cy="1524000"/>
+          </a:xfrm>
+          <a:prstGeom prst="rect">
+            <a:avLst/>
+          </a:prstGeom>
+        </p:spPr>
+      </p:pic>
+      <p:pic>
+        <p:nvPicPr>
+          <p:cNvPr id="5" name="Picture 4" descr="n_5.jpg"/>
+          <p:cNvPicPr>
+            <a:picLocks noChangeAspect="1"/>
+          </p:cNvPicPr>
+          <p:nvPr/>
+        </p:nvPicPr>
+        <p:blipFill>
+          <a:blip r:embed="rId3" cstate="print"/>
+          <a:stretch>
+            <a:fillRect/>
+          </a:stretch>
+        </p:blipFill>
+        <p:spPr>
+          <a:xfrm>
+            <a:off x="6553200" y="5105400"/>
+            <a:ext cx="1524000" cy="1524000"/>
+          </a:xfrm>
+          <a:prstGeom prst="rect">
+            <a:avLst/>
+          </a:prstGeom>
+        </p:spPr>
+      </p:pic>
     </p:spTree>
   </p:cSld>
   <p:clrMapOvr>
     <a:masterClrMapping/>
   </p:clrMapOvr>
+  <p:timing>
+    <p:tnLst>
+      <p:par>
+        <p:cTn id="1" dur="indefinite" restart="never" nodeType="tmRoot"/>
+      </p:par>
+    </p:tnLst>
+  </p:timing>
 </p:sld>
 </file>
 
@@ -6352,6 +6427,13 @@
   <p:clrMapOvr>
     <a:masterClrMapping/>
   </p:clrMapOvr>
+  <p:timing>
+    <p:tnLst>
+      <p:par>
+        <p:cTn id="1" dur="indefinite" restart="never" nodeType="tmRoot"/>
+      </p:par>
+    </p:tnLst>
+  </p:timing>
 </p:sld>
 </file>
 
@@ -6430,6 +6512,13 @@
   <p:clrMapOvr>
     <a:masterClrMapping/>
   </p:clrMapOvr>
+  <p:timing>
+    <p:tnLst>
+      <p:par>
+        <p:cTn id="1" dur="indefinite" restart="never" nodeType="tmRoot"/>
+      </p:par>
+    </p:tnLst>
+  </p:timing>
 </p:sld>
 </file>
 

</xml_diff>